<commit_message>
update schema and added workflows
</commit_message>
<xml_diff>
--- a/docs/modules/ROOT/pages/alcor_agents/AGA_design.pptx
+++ b/docs/modules/ROOT/pages/alcor_agents/AGA_design.pptx
@@ -222,7 +222,7 @@
           <a:p>
             <a:fld id="{027A9787-ED9C-DD45-9343-9117E52B77E3}" type="datetimeFigureOut">
               <a:rPr lang="en-US" smtClean="0"/>
-              <a:t>2/5/21</a:t>
+              <a:t>2/9/21</a:t>
             </a:fld>
             <a:endParaRPr lang="en-US"/>
           </a:p>
@@ -1548,7 +1548,7 @@
           <a:p>
             <a:fld id="{3E6E40AA-6AEA-3E4C-834D-1791CEC61FE5}" type="datetimeFigureOut">
               <a:rPr lang="en-US" smtClean="0"/>
-              <a:t>2/5/21</a:t>
+              <a:t>2/9/21</a:t>
             </a:fld>
             <a:endParaRPr lang="en-US"/>
           </a:p>
@@ -1746,7 +1746,7 @@
           <a:p>
             <a:fld id="{3E6E40AA-6AEA-3E4C-834D-1791CEC61FE5}" type="datetimeFigureOut">
               <a:rPr lang="en-US" smtClean="0"/>
-              <a:t>2/5/21</a:t>
+              <a:t>2/9/21</a:t>
             </a:fld>
             <a:endParaRPr lang="en-US"/>
           </a:p>
@@ -1954,7 +1954,7 @@
           <a:p>
             <a:fld id="{3E6E40AA-6AEA-3E4C-834D-1791CEC61FE5}" type="datetimeFigureOut">
               <a:rPr lang="en-US" smtClean="0"/>
-              <a:t>2/5/21</a:t>
+              <a:t>2/9/21</a:t>
             </a:fld>
             <a:endParaRPr lang="en-US"/>
           </a:p>
@@ -2152,7 +2152,7 @@
           <a:p>
             <a:fld id="{3E6E40AA-6AEA-3E4C-834D-1791CEC61FE5}" type="datetimeFigureOut">
               <a:rPr lang="en-US" smtClean="0"/>
-              <a:t>2/5/21</a:t>
+              <a:t>2/9/21</a:t>
             </a:fld>
             <a:endParaRPr lang="en-US"/>
           </a:p>
@@ -2427,7 +2427,7 @@
           <a:p>
             <a:fld id="{3E6E40AA-6AEA-3E4C-834D-1791CEC61FE5}" type="datetimeFigureOut">
               <a:rPr lang="en-US" smtClean="0"/>
-              <a:t>2/5/21</a:t>
+              <a:t>2/9/21</a:t>
             </a:fld>
             <a:endParaRPr lang="en-US"/>
           </a:p>
@@ -2692,7 +2692,7 @@
           <a:p>
             <a:fld id="{3E6E40AA-6AEA-3E4C-834D-1791CEC61FE5}" type="datetimeFigureOut">
               <a:rPr lang="en-US" smtClean="0"/>
-              <a:t>2/5/21</a:t>
+              <a:t>2/9/21</a:t>
             </a:fld>
             <a:endParaRPr lang="en-US"/>
           </a:p>
@@ -3104,7 +3104,7 @@
           <a:p>
             <a:fld id="{3E6E40AA-6AEA-3E4C-834D-1791CEC61FE5}" type="datetimeFigureOut">
               <a:rPr lang="en-US" smtClean="0"/>
-              <a:t>2/5/21</a:t>
+              <a:t>2/9/21</a:t>
             </a:fld>
             <a:endParaRPr lang="en-US"/>
           </a:p>
@@ -3245,7 +3245,7 @@
           <a:p>
             <a:fld id="{3E6E40AA-6AEA-3E4C-834D-1791CEC61FE5}" type="datetimeFigureOut">
               <a:rPr lang="en-US" smtClean="0"/>
-              <a:t>2/5/21</a:t>
+              <a:t>2/9/21</a:t>
             </a:fld>
             <a:endParaRPr lang="en-US"/>
           </a:p>
@@ -3358,7 +3358,7 @@
           <a:p>
             <a:fld id="{3E6E40AA-6AEA-3E4C-834D-1791CEC61FE5}" type="datetimeFigureOut">
               <a:rPr lang="en-US" smtClean="0"/>
-              <a:t>2/5/21</a:t>
+              <a:t>2/9/21</a:t>
             </a:fld>
             <a:endParaRPr lang="en-US"/>
           </a:p>
@@ -3669,7 +3669,7 @@
           <a:p>
             <a:fld id="{3E6E40AA-6AEA-3E4C-834D-1791CEC61FE5}" type="datetimeFigureOut">
               <a:rPr lang="en-US" smtClean="0"/>
-              <a:t>2/5/21</a:t>
+              <a:t>2/9/21</a:t>
             </a:fld>
             <a:endParaRPr lang="en-US"/>
           </a:p>
@@ -3957,7 +3957,7 @@
           <a:p>
             <a:fld id="{3E6E40AA-6AEA-3E4C-834D-1791CEC61FE5}" type="datetimeFigureOut">
               <a:rPr lang="en-US" smtClean="0"/>
-              <a:t>2/5/21</a:t>
+              <a:t>2/9/21</a:t>
             </a:fld>
             <a:endParaRPr lang="en-US"/>
           </a:p>
@@ -4198,7 +4198,7 @@
           <a:p>
             <a:fld id="{3E6E40AA-6AEA-3E4C-834D-1791CEC61FE5}" type="datetimeFigureOut">
               <a:rPr lang="en-US" smtClean="0"/>
-              <a:t>2/5/21</a:t>
+              <a:t>2/9/21</a:t>
             </a:fld>
             <a:endParaRPr lang="en-US"/>
           </a:p>
@@ -18830,18 +18830,18 @@
         </p:nvSpPr>
         <p:spPr>
           <a:xfrm>
-            <a:off x="105168" y="762872"/>
-            <a:ext cx="7561038" cy="5923766"/>
+            <a:off x="105167" y="762871"/>
+            <a:ext cx="7692913" cy="5967753"/>
           </a:xfrm>
         </p:spPr>
         <p:txBody>
           <a:bodyPr>
-            <a:normAutofit fontScale="70000" lnSpcReduction="20000"/>
+            <a:normAutofit fontScale="92500" lnSpcReduction="20000"/>
           </a:bodyPr>
           <a:lstStyle/>
           <a:p>
             <a:r>
-              <a:rPr lang="en-US" u="sng" dirty="0">
+              <a:rPr lang="en-US" sz="2000" u="sng" dirty="0">
                 <a:solidFill>
                   <a:srgbClr val="FF0000"/>
                 </a:solidFill>
@@ -18851,7 +18851,7 @@
           </a:p>
           <a:p>
             <a:r>
-              <a:rPr lang="en-US" dirty="0">
+              <a:rPr lang="en-US" sz="2000" dirty="0">
                 <a:solidFill>
                   <a:srgbClr val="FF0000"/>
                 </a:solidFill>
@@ -18861,10 +18861,10 @@
           </a:p>
           <a:p>
             <a:r>
-              <a:rPr lang="en-US" dirty="0"/>
+              <a:rPr lang="en-US" sz="2000" dirty="0"/>
               <a:t>If the L2/L3 neighbor rule is found, we need to assume the corresponding SG rule is already downloaded and installed on host</a:t>
             </a:r>
-            <a:endParaRPr lang="en-US" dirty="0">
+            <a:endParaRPr lang="en-US" sz="2000" dirty="0">
               <a:solidFill>
                 <a:srgbClr val="FF0000"/>
               </a:solidFill>
@@ -18872,7 +18872,7 @@
           </a:p>
           <a:p>
             <a:r>
-              <a:rPr lang="en-US" dirty="0">
+              <a:rPr lang="en-US" sz="2000" dirty="0">
                 <a:solidFill>
                   <a:srgbClr val="FF0000"/>
                 </a:solidFill>
@@ -18883,142 +18883,152 @@
           <a:p>
             <a:pPr lvl="1"/>
             <a:r>
-              <a:rPr lang="en-US" dirty="0" err="1"/>
+              <a:rPr lang="en-US" sz="1600" dirty="0" err="1"/>
               <a:t>rpc</a:t>
             </a:r>
             <a:r>
-              <a:rPr lang="en-US" dirty="0"/>
+              <a:rPr lang="en-US" sz="1600" dirty="0"/>
               <a:t> </a:t>
             </a:r>
             <a:r>
-              <a:rPr lang="en-US" dirty="0" err="1"/>
+              <a:rPr lang="en-US" sz="1600" dirty="0" err="1"/>
               <a:t>RetrieveNetworkResourceStatesStream</a:t>
             </a:r>
             <a:r>
-              <a:rPr lang="en-US" dirty="0"/>
+              <a:rPr lang="en-US" sz="1600" dirty="0"/>
               <a:t> (new)</a:t>
             </a:r>
           </a:p>
           <a:p>
             <a:pPr lvl="1"/>
             <a:r>
-              <a:rPr lang="en-US" dirty="0"/>
-              <a:t>Input: VNI, source/destination IP, source/destination port, protocol - TCP/UDP/Other(ARP/ICMP) (note: port ID is not available in the packet, but likely available in ACA)</a:t>
+              <a:rPr lang="en-US" sz="1600" dirty="0"/>
+              <a:t>Input: </a:t>
+            </a:r>
+            <a:r>
+              <a:rPr lang="en-US" sz="1600" dirty="0" err="1"/>
+              <a:t>GoalStateRequest</a:t>
+            </a:r>
+            <a:r>
+              <a:rPr lang="en-US" sz="1600" dirty="0"/>
+              <a:t> - </a:t>
+            </a:r>
+            <a:r>
+              <a:rPr lang="en-US" sz="1600" dirty="0" err="1"/>
+              <a:t>request_type</a:t>
+            </a:r>
+            <a:r>
+              <a:rPr lang="en-US" sz="1600" dirty="0"/>
+              <a:t>=ON_DEMAND, </a:t>
+            </a:r>
+            <a:r>
+              <a:rPr lang="en-US" sz="1600" dirty="0" err="1"/>
+              <a:t>request_id</a:t>
+            </a:r>
+            <a:r>
+              <a:rPr lang="en-US" sz="1600" dirty="0"/>
+              <a:t> (generated by ACA), </a:t>
+            </a:r>
+            <a:r>
+              <a:rPr lang="en-US" sz="1600" dirty="0" err="1"/>
+              <a:t>tunnel_id</a:t>
+            </a:r>
+            <a:r>
+              <a:rPr lang="en-US" sz="1600" dirty="0"/>
+              <a:t>, source port ID or IP, destination IP, source/destination port, protocol - TCP/UDP/Other(ARP/ICMP) </a:t>
             </a:r>
           </a:p>
           <a:p>
             <a:pPr lvl="1"/>
             <a:r>
-              <a:rPr lang="en-US" dirty="0"/>
+              <a:rPr lang="en-US" sz="1600" dirty="0"/>
               <a:t>AGA Workflow:</a:t>
             </a:r>
           </a:p>
           <a:p>
             <a:pPr lvl="2"/>
             <a:r>
-              <a:rPr lang="en-US" dirty="0"/>
+              <a:rPr lang="en-US" sz="1400" dirty="0"/>
               <a:t>Use VNI to lookup VPC</a:t>
             </a:r>
           </a:p>
           <a:p>
             <a:pPr lvl="2"/>
             <a:r>
-              <a:rPr lang="en-US" dirty="0"/>
+              <a:rPr lang="en-US" sz="1400" dirty="0"/>
               <a:t>For all ports in VPC, find the source port ID based on IP</a:t>
             </a:r>
           </a:p>
           <a:p>
             <a:pPr lvl="3"/>
             <a:r>
-              <a:rPr lang="en-US" dirty="0"/>
+              <a:rPr lang="en-US" sz="1200" dirty="0"/>
               <a:t>For destination IP on the same subnet, confirm it is L2 neighbor</a:t>
             </a:r>
           </a:p>
           <a:p>
             <a:pPr lvl="3"/>
             <a:r>
-              <a:rPr lang="en-US" dirty="0"/>
+              <a:rPr lang="en-US" sz="1200" dirty="0"/>
               <a:t>For destination IP on the different subnet, confirm it is L3 neighbor</a:t>
             </a:r>
           </a:p>
           <a:p>
             <a:pPr lvl="3"/>
             <a:r>
-              <a:rPr lang="en-US" dirty="0"/>
+              <a:rPr lang="en-US" sz="1200" dirty="0"/>
               <a:t>For destination IP from routing rule or gateway, the configurations should be in ACA already</a:t>
             </a:r>
           </a:p>
           <a:p>
             <a:pPr lvl="2"/>
             <a:r>
-              <a:rPr lang="en-US" dirty="0"/>
+              <a:rPr lang="en-US" sz="1400" dirty="0"/>
               <a:t>If confirm it is L2/L3 neighbor, look up SG rules for source port</a:t>
             </a:r>
           </a:p>
           <a:p>
             <a:pPr lvl="3"/>
             <a:r>
-              <a:rPr lang="en-US" dirty="0"/>
+              <a:rPr lang="en-US" sz="1200" dirty="0"/>
               <a:t>If traffic is allowed, construct and track the corresponding SG config</a:t>
             </a:r>
           </a:p>
           <a:p>
             <a:pPr lvl="4"/>
             <a:r>
-              <a:rPr lang="en-US" dirty="0"/>
+              <a:rPr lang="en-US" sz="1200" dirty="0"/>
               <a:t>send down neighbor and corresponding SG rules</a:t>
             </a:r>
           </a:p>
           <a:p>
             <a:pPr lvl="4"/>
             <a:r>
-              <a:rPr lang="en-US" dirty="0"/>
-              <a:t>Reply </a:t>
-            </a:r>
-            <a:r>
-              <a:rPr lang="en-US" dirty="0" err="1"/>
-              <a:t>OperationStatus</a:t>
-            </a:r>
-            <a:r>
-              <a:rPr lang="en-US" dirty="0"/>
-              <a:t> = SUCCESS (routable) for the </a:t>
-            </a:r>
-            <a:r>
-              <a:rPr lang="en-US" dirty="0" err="1"/>
-              <a:t>rpc</a:t>
-            </a:r>
-            <a:r>
-              <a:rPr lang="en-US" dirty="0"/>
-              <a:t> call</a:t>
-            </a:r>
+              <a:rPr lang="en-US" sz="1200" dirty="0"/>
+              <a:t>send down port configuration with Operation = INFO (routable) for with corresponding </a:t>
+            </a:r>
+            <a:r>
+              <a:rPr lang="en-US" sz="1200" dirty="0" err="1"/>
+              <a:t>request_id</a:t>
+            </a:r>
+            <a:endParaRPr lang="en-US" sz="1200" dirty="0"/>
           </a:p>
           <a:p>
             <a:pPr lvl="3"/>
             <a:r>
-              <a:rPr lang="en-US" dirty="0"/>
-              <a:t>Reply </a:t>
-            </a:r>
-            <a:r>
-              <a:rPr lang="en-US" dirty="0" err="1"/>
-              <a:t>OperationStatus</a:t>
-            </a:r>
-            <a:r>
-              <a:rPr lang="en-US" dirty="0"/>
-              <a:t> = FAILURE (not routable) for the </a:t>
-            </a:r>
-            <a:r>
-              <a:rPr lang="en-US" dirty="0" err="1"/>
-              <a:t>rpc</a:t>
-            </a:r>
-            <a:r>
-              <a:rPr lang="en-US" dirty="0"/>
-              <a:t> call</a:t>
-            </a:r>
+              <a:rPr lang="en-US" sz="1200" dirty="0"/>
+              <a:t>send down port configuration with Operation = NOT_ROUTABLE (not routable) for with corresponding </a:t>
+            </a:r>
+            <a:r>
+              <a:rPr lang="en-US" sz="1200" dirty="0" err="1"/>
+              <a:t>request_id</a:t>
+            </a:r>
+            <a:endParaRPr lang="en-US" sz="1200" dirty="0"/>
           </a:p>
           <a:p>
             <a:pPr lvl="2"/>
             <a:r>
-              <a:rPr lang="en-US" dirty="0">
+              <a:rPr lang="en-US" sz="1400" dirty="0">
                 <a:solidFill>
                   <a:srgbClr val="FF0000"/>
                 </a:solidFill>
@@ -19029,7 +19039,7 @@
           <a:p>
             <a:pPr lvl="1"/>
             <a:r>
-              <a:rPr lang="en-US" dirty="0">
+              <a:rPr lang="en-US" sz="1600" dirty="0">
                 <a:solidFill>
                   <a:srgbClr val="FF0000"/>
                 </a:solidFill>
@@ -19040,7 +19050,7 @@
           <a:p>
             <a:pPr lvl="1"/>
             <a:r>
-              <a:rPr lang="en-US" dirty="0"/>
+              <a:rPr lang="en-US" sz="1600" dirty="0"/>
               <a:t>Goal is less than 1 milli-second on this ACA to AGA delay</a:t>
             </a:r>
           </a:p>
@@ -29006,9 +29016,31 @@
             </a:r>
             <a:r>
               <a:rPr lang="en-US" dirty="0" err="1"/>
-              <a:t>GoalStateOperationStatus</a:t>
+              <a:t>GoalStateRequest</a:t>
             </a:r>
             <a:endParaRPr lang="en-US" dirty="0"/>
+          </a:p>
+          <a:p>
+            <a:pPr lvl="1"/>
+            <a:r>
+              <a:rPr lang="en-US" dirty="0" err="1"/>
+              <a:t>request_type</a:t>
+            </a:r>
+            <a:r>
+              <a:rPr lang="en-US" dirty="0"/>
+              <a:t>=OUT_OF_ORDER</a:t>
+            </a:r>
+          </a:p>
+          <a:p>
+            <a:pPr lvl="1"/>
+            <a:r>
+              <a:rPr lang="en-US" dirty="0" err="1"/>
+              <a:t>request_id</a:t>
+            </a:r>
+            <a:r>
+              <a:rPr lang="en-US" dirty="0"/>
+              <a:t> (generated by ACA)</a:t>
+            </a:r>
           </a:p>
           <a:p>
             <a:pPr lvl="1"/>
@@ -29033,20 +29065,13 @@
             </a:r>
           </a:p>
           <a:p>
-            <a:pPr lvl="1"/>
-            <a:r>
-              <a:rPr lang="en-US" dirty="0" err="1"/>
-              <a:t>operation_status</a:t>
+            <a:r>
+              <a:rPr lang="en-US"/>
+              <a:t>DPM-</a:t>
             </a:r>
             <a:r>
               <a:rPr lang="en-US" dirty="0"/>
-              <a:t> = OUT_OF_ORDER</a:t>
-            </a:r>
-          </a:p>
-          <a:p>
-            <a:r>
-              <a:rPr lang="en-US" dirty="0"/>
-              <a:t>DPM-&gt;AGA</a:t>
+              <a:t>&gt;AGA</a:t>
             </a:r>
           </a:p>
           <a:p>
@@ -35874,7 +35899,7 @@
             </a:r>
             <a:r>
               <a:rPr lang="en-US" dirty="0" err="1"/>
-              <a:t>GoalStateOperationStatus</a:t>
+              <a:t>GoalStateRequest</a:t>
             </a:r>
             <a:endParaRPr lang="en-US" dirty="0"/>
           </a:p>
@@ -35882,41 +35907,22 @@
             <a:pPr lvl="1"/>
             <a:r>
               <a:rPr lang="en-US" dirty="0" err="1"/>
-              <a:t>resource_id</a:t>
+              <a:t>request_type</a:t>
             </a:r>
             <a:r>
               <a:rPr lang="en-US" dirty="0"/>
-              <a:t> = doesn’t matter</a:t>
+              <a:t>=RESTARTED</a:t>
             </a:r>
           </a:p>
           <a:p>
             <a:pPr lvl="1"/>
             <a:r>
               <a:rPr lang="en-US" dirty="0" err="1"/>
-              <a:t>resource_type</a:t>
+              <a:t>request_id</a:t>
             </a:r>
             <a:r>
               <a:rPr lang="en-US" dirty="0"/>
-              <a:t> = doesn’t matter</a:t>
-            </a:r>
-          </a:p>
-          <a:p>
-            <a:pPr lvl="1"/>
-            <a:r>
-              <a:rPr lang="en-US" dirty="0" err="1"/>
-              <a:t>operation_status</a:t>
-            </a:r>
-            <a:r>
-              <a:rPr lang="en-US" dirty="0"/>
-              <a:t> = </a:t>
-            </a:r>
-            <a:r>
-              <a:rPr lang="en-US" dirty="0">
-                <a:solidFill>
-                  <a:srgbClr val="FF0000"/>
-                </a:solidFill>
-              </a:rPr>
-              <a:t>RESTARTED</a:t>
+              <a:t> (generated by ACA)</a:t>
             </a:r>
           </a:p>
           <a:p>

</xml_diff>